<commit_message>
added 1 slide to astart
</commit_message>
<xml_diff>
--- a/07-GraphSearching.pptx
+++ b/07-GraphSearching.pptx
@@ -5,7 +5,7 @@
     <p:sldMasterId id="2147483840" r:id="rId1"/>
   </p:sldMasterIdLst>
   <p:notesMasterIdLst>
-    <p:notesMasterId r:id="rId24"/>
+    <p:notesMasterId r:id="rId25"/>
   </p:notesMasterIdLst>
   <p:sldIdLst>
     <p:sldId id="256" r:id="rId2"/>
@@ -26,10 +26,11 @@
     <p:sldId id="259" r:id="rId17"/>
     <p:sldId id="274" r:id="rId18"/>
     <p:sldId id="275" r:id="rId19"/>
-    <p:sldId id="276" r:id="rId20"/>
-    <p:sldId id="278" r:id="rId21"/>
-    <p:sldId id="277" r:id="rId22"/>
-    <p:sldId id="265" r:id="rId23"/>
+    <p:sldId id="279" r:id="rId20"/>
+    <p:sldId id="276" r:id="rId21"/>
+    <p:sldId id="278" r:id="rId22"/>
+    <p:sldId id="277" r:id="rId23"/>
+    <p:sldId id="265" r:id="rId24"/>
   </p:sldIdLst>
   <p:sldSz cx="12192000" cy="6858000"/>
   <p:notesSz cx="6858000" cy="9144000"/>
@@ -128,6 +129,11 @@
       </a:defRPr>
     </a:lvl9pPr>
   </p:defaultTextStyle>
+  <p:extLst>
+    <p:ext uri="{EFAFB233-063F-42B5-8137-9DF3F51BA10A}">
+      <p15:sldGuideLst xmlns:p15="http://schemas.microsoft.com/office/powerpoint/2012/main"/>
+    </p:ext>
+  </p:extLst>
 </p:presentation>
 </file>
 
@@ -213,7 +219,7 @@
           <a:p>
             <a:fld id="{E13F6215-85C5-4744-A168-26187E778E8F}" type="datetimeFigureOut">
               <a:rPr lang="en-CA" smtClean="0"/>
-              <a:t>2014-10-21</a:t>
+              <a:t>2014-10-23</a:t>
             </a:fld>
             <a:endParaRPr lang="en-CA"/>
           </a:p>
@@ -805,7 +811,7 @@
             <a:fld id="{5586B75A-687E-405C-8A0B-8D00578BA2C3}" type="datetimeFigureOut">
               <a:rPr lang="en-US" dirty="0"/>
               <a:pPr/>
-              <a:t>10/21/2014</a:t>
+              <a:t>10/23/2014</a:t>
             </a:fld>
             <a:endParaRPr lang="en-US" dirty="0"/>
           </a:p>
@@ -991,7 +997,7 @@
           <a:p>
             <a:fld id="{5F4E5243-F52A-4D37-9694-EB26C6C31910}" type="datetimeFigureOut">
               <a:rPr lang="en-US" dirty="0"/>
-              <a:t>10/21/2014</a:t>
+              <a:t>10/23/2014</a:t>
             </a:fld>
             <a:endParaRPr lang="en-US" dirty="0"/>
           </a:p>
@@ -1166,7 +1172,7 @@
           <a:p>
             <a:fld id="{3A77B6E1-634A-48DC-9E8B-D894023267EF}" type="datetimeFigureOut">
               <a:rPr lang="en-US" dirty="0"/>
-              <a:t>10/21/2014</a:t>
+              <a:t>10/23/2014</a:t>
             </a:fld>
             <a:endParaRPr lang="en-US" dirty="0"/>
           </a:p>
@@ -1331,7 +1337,7 @@
           <a:p>
             <a:fld id="{7B2D3E9E-A95C-48F2-B4BF-A71542E0BE9A}" type="datetimeFigureOut">
               <a:rPr lang="en-US" dirty="0"/>
-              <a:t>10/21/2014</a:t>
+              <a:t>10/23/2014</a:t>
             </a:fld>
             <a:endParaRPr lang="en-US" dirty="0"/>
           </a:p>
@@ -1583,7 +1589,7 @@
             <a:fld id="{5586B75A-687E-405C-8A0B-8D00578BA2C3}" type="datetimeFigureOut">
               <a:rPr lang="en-US" dirty="0"/>
               <a:pPr/>
-              <a:t>10/21/2014</a:t>
+              <a:t>10/23/2014</a:t>
             </a:fld>
             <a:endParaRPr lang="en-US" dirty="0"/>
           </a:p>
@@ -1867,7 +1873,7 @@
           <a:p>
             <a:fld id="{F12952B5-7A2F-4CC8-B7CE-9234E21C2837}" type="datetimeFigureOut">
               <a:rPr lang="en-US" dirty="0"/>
-              <a:t>10/21/2014</a:t>
+              <a:t>10/23/2014</a:t>
             </a:fld>
             <a:endParaRPr lang="en-US" dirty="0"/>
           </a:p>
@@ -2300,7 +2306,7 @@
           <a:p>
             <a:fld id="{CE1DA07A-9201-4B4B-BAF2-015AFA30F520}" type="datetimeFigureOut">
               <a:rPr lang="en-US" dirty="0"/>
-              <a:t>10/21/2014</a:t>
+              <a:t>10/23/2014</a:t>
             </a:fld>
             <a:endParaRPr lang="en-US" dirty="0"/>
           </a:p>
@@ -2413,7 +2419,7 @@
           <a:p>
             <a:fld id="{73D7E00A-486F-4252-8B1D-E32645521F49}" type="datetimeFigureOut">
               <a:rPr lang="en-US" dirty="0"/>
-              <a:t>10/21/2014</a:t>
+              <a:t>10/23/2014</a:t>
             </a:fld>
             <a:endParaRPr lang="en-US" dirty="0"/>
           </a:p>
@@ -2503,7 +2509,7 @@
           <a:p>
             <a:fld id="{8DDF5F92-E675-4B36-9A60-69A962A68675}" type="datetimeFigureOut">
               <a:rPr lang="en-US" dirty="0"/>
-              <a:t>10/21/2014</a:t>
+              <a:t>10/23/2014</a:t>
             </a:fld>
             <a:endParaRPr lang="en-US" dirty="0"/>
           </a:p>
@@ -2854,7 +2860,7 @@
           <a:p>
             <a:fld id="{AF6E2C9B-5FA2-460D-9BE7-B0812FC2A6FF}" type="datetimeFigureOut">
               <a:rPr lang="en-US" dirty="0"/>
-              <a:t>10/21/2014</a:t>
+              <a:t>10/23/2014</a:t>
             </a:fld>
             <a:endParaRPr lang="en-US" dirty="0"/>
           </a:p>
@@ -3167,7 +3173,7 @@
             <a:fld id="{5586B75A-687E-405C-8A0B-8D00578BA2C3}" type="datetimeFigureOut">
               <a:rPr lang="en-US" dirty="0"/>
               <a:pPr/>
-              <a:t>10/21/2014</a:t>
+              <a:t>10/23/2014</a:t>
             </a:fld>
             <a:endParaRPr lang="en-US" dirty="0"/>
           </a:p>
@@ -3397,7 +3403,7 @@
             <a:fld id="{5586B75A-687E-405C-8A0B-8D00578BA2C3}" type="datetimeFigureOut">
               <a:rPr lang="en-US" dirty="0"/>
               <a:pPr/>
-              <a:t>10/21/2014</a:t>
+              <a:t>10/23/2014</a:t>
             </a:fld>
             <a:endParaRPr lang="en-US" dirty="0"/>
           </a:p>
@@ -9055,7 +9061,7 @@
           <a:p>
             <a:r>
               <a:rPr lang="en-CA" dirty="0" smtClean="0"/>
-              <a:t>Yeah but I’m using a grid as my graph</a:t>
+              <a:t>What is a Cost?</a:t>
             </a:r>
             <a:endParaRPr lang="en-CA" dirty="0"/>
           </a:p>
@@ -9063,31 +9069,427 @@
       </p:sp>
       <p:sp>
         <p:nvSpPr>
-          <p:cNvPr id="3" name="Content Placeholder 2"/>
-          <p:cNvSpPr>
-            <a:spLocks noGrp="1"/>
-          </p:cNvSpPr>
-          <p:nvPr>
-            <p:ph idx="1"/>
-          </p:nvPr>
-        </p:nvSpPr>
-        <p:spPr/>
-        <p:txBody>
-          <a:bodyPr/>
+          <p:cNvPr id="5" name="Oval 4"/>
+          <p:cNvSpPr/>
+          <p:nvPr/>
+        </p:nvSpPr>
+        <p:spPr>
+          <a:xfrm>
+            <a:off x="1705708" y="3253154"/>
+            <a:ext cx="1037492" cy="1037492"/>
+          </a:xfrm>
+          <a:prstGeom prst="ellipse">
+            <a:avLst/>
+          </a:prstGeom>
+        </p:spPr>
+        <p:style>
+          <a:lnRef idx="2">
+            <a:schemeClr val="accent1">
+              <a:shade val="50000"/>
+            </a:schemeClr>
+          </a:lnRef>
+          <a:fillRef idx="1">
+            <a:schemeClr val="accent1"/>
+          </a:fillRef>
+          <a:effectRef idx="0">
+            <a:schemeClr val="accent1"/>
+          </a:effectRef>
+          <a:fontRef idx="minor">
+            <a:schemeClr val="lt1"/>
+          </a:fontRef>
+        </p:style>
+        <p:txBody>
+          <a:bodyPr rtlCol="0" anchor="ctr"/>
           <a:lstStyle/>
           <a:p>
+            <a:pPr algn="ctr"/>
             <a:r>
               <a:rPr lang="en-CA" dirty="0" smtClean="0"/>
-              <a:t>Ok lets look at the example code</a:t>
+              <a:t>Start</a:t>
             </a:r>
             <a:endParaRPr lang="en-CA" dirty="0"/>
+          </a:p>
+        </p:txBody>
+      </p:sp>
+      <p:sp>
+        <p:nvSpPr>
+          <p:cNvPr id="7" name="Oval 6"/>
+          <p:cNvSpPr/>
+          <p:nvPr/>
+        </p:nvSpPr>
+        <p:spPr>
+          <a:xfrm>
+            <a:off x="8856785" y="3253154"/>
+            <a:ext cx="1037492" cy="1037492"/>
+          </a:xfrm>
+          <a:prstGeom prst="ellipse">
+            <a:avLst/>
+          </a:prstGeom>
+        </p:spPr>
+        <p:style>
+          <a:lnRef idx="2">
+            <a:schemeClr val="accent1">
+              <a:shade val="50000"/>
+            </a:schemeClr>
+          </a:lnRef>
+          <a:fillRef idx="1">
+            <a:schemeClr val="accent1"/>
+          </a:fillRef>
+          <a:effectRef idx="0">
+            <a:schemeClr val="accent1"/>
+          </a:effectRef>
+          <a:fontRef idx="minor">
+            <a:schemeClr val="lt1"/>
+          </a:fontRef>
+        </p:style>
+        <p:txBody>
+          <a:bodyPr rtlCol="0" anchor="ctr"/>
+          <a:lstStyle/>
+          <a:p>
+            <a:pPr algn="ctr"/>
+            <a:r>
+              <a:rPr lang="en-CA" dirty="0" smtClean="0"/>
+              <a:t>Goal</a:t>
+            </a:r>
+            <a:endParaRPr lang="en-CA" dirty="0"/>
+          </a:p>
+        </p:txBody>
+      </p:sp>
+      <p:sp>
+        <p:nvSpPr>
+          <p:cNvPr id="8" name="Rectangle 7"/>
+          <p:cNvSpPr/>
+          <p:nvPr/>
+        </p:nvSpPr>
+        <p:spPr>
+          <a:xfrm>
+            <a:off x="5205045" y="4290646"/>
+            <a:ext cx="1055077" cy="685800"/>
+          </a:xfrm>
+          <a:prstGeom prst="rect">
+            <a:avLst/>
+          </a:prstGeom>
+        </p:spPr>
+        <p:style>
+          <a:lnRef idx="2">
+            <a:schemeClr val="dk1">
+              <a:shade val="50000"/>
+            </a:schemeClr>
+          </a:lnRef>
+          <a:fillRef idx="1">
+            <a:schemeClr val="dk1"/>
+          </a:fillRef>
+          <a:effectRef idx="0">
+            <a:schemeClr val="dk1"/>
+          </a:effectRef>
+          <a:fontRef idx="minor">
+            <a:schemeClr val="lt1"/>
+          </a:fontRef>
+        </p:style>
+        <p:txBody>
+          <a:bodyPr rtlCol="0" anchor="ctr"/>
+          <a:lstStyle/>
+          <a:p>
+            <a:pPr algn="ctr"/>
+            <a:r>
+              <a:rPr lang="en-CA" dirty="0" smtClean="0"/>
+              <a:t>Current point</a:t>
+            </a:r>
+            <a:endParaRPr lang="en-CA" dirty="0"/>
+          </a:p>
+        </p:txBody>
+      </p:sp>
+      <p:cxnSp>
+        <p:nvCxnSpPr>
+          <p:cNvPr id="10" name="Straight Arrow Connector 9"/>
+          <p:cNvCxnSpPr>
+            <a:stCxn id="5" idx="6"/>
+            <a:endCxn id="8" idx="1"/>
+          </p:cNvCxnSpPr>
+          <p:nvPr/>
+        </p:nvCxnSpPr>
+        <p:spPr>
+          <a:xfrm>
+            <a:off x="2743200" y="3771900"/>
+            <a:ext cx="2461845" cy="861646"/>
+          </a:xfrm>
+          <a:prstGeom prst="straightConnector1">
+            <a:avLst/>
+          </a:prstGeom>
+          <a:ln>
+            <a:tailEnd type="triangle"/>
+          </a:ln>
+        </p:spPr>
+        <p:style>
+          <a:lnRef idx="1">
+            <a:schemeClr val="accent1"/>
+          </a:lnRef>
+          <a:fillRef idx="0">
+            <a:schemeClr val="accent1"/>
+          </a:fillRef>
+          <a:effectRef idx="0">
+            <a:schemeClr val="accent1"/>
+          </a:effectRef>
+          <a:fontRef idx="minor">
+            <a:schemeClr val="tx1"/>
+          </a:fontRef>
+        </p:style>
+      </p:cxnSp>
+      <p:sp>
+        <p:nvSpPr>
+          <p:cNvPr id="13" name="Freeform 12"/>
+          <p:cNvSpPr/>
+          <p:nvPr/>
+        </p:nvSpPr>
+        <p:spPr>
+          <a:xfrm>
+            <a:off x="6312877" y="3938954"/>
+            <a:ext cx="2514600" cy="685800"/>
+          </a:xfrm>
+          <a:custGeom>
+            <a:avLst/>
+            <a:gdLst>
+              <a:gd name="connsiteX0" fmla="*/ 0 w 2514600"/>
+              <a:gd name="connsiteY0" fmla="*/ 685800 h 685800"/>
+              <a:gd name="connsiteX1" fmla="*/ 228600 w 2514600"/>
+              <a:gd name="connsiteY1" fmla="*/ 404446 h 685800"/>
+              <a:gd name="connsiteX2" fmla="*/ 703385 w 2514600"/>
+              <a:gd name="connsiteY2" fmla="*/ 668215 h 685800"/>
+              <a:gd name="connsiteX3" fmla="*/ 879231 w 2514600"/>
+              <a:gd name="connsiteY3" fmla="*/ 298938 h 685800"/>
+              <a:gd name="connsiteX4" fmla="*/ 1371600 w 2514600"/>
+              <a:gd name="connsiteY4" fmla="*/ 439615 h 685800"/>
+              <a:gd name="connsiteX5" fmla="*/ 1529861 w 2514600"/>
+              <a:gd name="connsiteY5" fmla="*/ 87923 h 685800"/>
+              <a:gd name="connsiteX6" fmla="*/ 1951892 w 2514600"/>
+              <a:gd name="connsiteY6" fmla="*/ 281354 h 685800"/>
+              <a:gd name="connsiteX7" fmla="*/ 2127738 w 2514600"/>
+              <a:gd name="connsiteY7" fmla="*/ 35169 h 685800"/>
+              <a:gd name="connsiteX8" fmla="*/ 2356338 w 2514600"/>
+              <a:gd name="connsiteY8" fmla="*/ 123092 h 685800"/>
+              <a:gd name="connsiteX9" fmla="*/ 2514600 w 2514600"/>
+              <a:gd name="connsiteY9" fmla="*/ 0 h 685800"/>
+            </a:gdLst>
+            <a:ahLst/>
+            <a:cxnLst>
+              <a:cxn ang="0">
+                <a:pos x="connsiteX0" y="connsiteY0"/>
+              </a:cxn>
+              <a:cxn ang="0">
+                <a:pos x="connsiteX1" y="connsiteY1"/>
+              </a:cxn>
+              <a:cxn ang="0">
+                <a:pos x="connsiteX2" y="connsiteY2"/>
+              </a:cxn>
+              <a:cxn ang="0">
+                <a:pos x="connsiteX3" y="connsiteY3"/>
+              </a:cxn>
+              <a:cxn ang="0">
+                <a:pos x="connsiteX4" y="connsiteY4"/>
+              </a:cxn>
+              <a:cxn ang="0">
+                <a:pos x="connsiteX5" y="connsiteY5"/>
+              </a:cxn>
+              <a:cxn ang="0">
+                <a:pos x="connsiteX6" y="connsiteY6"/>
+              </a:cxn>
+              <a:cxn ang="0">
+                <a:pos x="connsiteX7" y="connsiteY7"/>
+              </a:cxn>
+              <a:cxn ang="0">
+                <a:pos x="connsiteX8" y="connsiteY8"/>
+              </a:cxn>
+              <a:cxn ang="0">
+                <a:pos x="connsiteX9" y="connsiteY9"/>
+              </a:cxn>
+            </a:cxnLst>
+            <a:rect l="l" t="t" r="r" b="b"/>
+            <a:pathLst>
+              <a:path w="2514600" h="685800">
+                <a:moveTo>
+                  <a:pt x="0" y="685800"/>
+                </a:moveTo>
+                <a:cubicBezTo>
+                  <a:pt x="55684" y="546588"/>
+                  <a:pt x="111369" y="407377"/>
+                  <a:pt x="228600" y="404446"/>
+                </a:cubicBezTo>
+                <a:cubicBezTo>
+                  <a:pt x="345831" y="401515"/>
+                  <a:pt x="594947" y="685800"/>
+                  <a:pt x="703385" y="668215"/>
+                </a:cubicBezTo>
+                <a:cubicBezTo>
+                  <a:pt x="811823" y="650630"/>
+                  <a:pt x="767862" y="337038"/>
+                  <a:pt x="879231" y="298938"/>
+                </a:cubicBezTo>
+                <a:cubicBezTo>
+                  <a:pt x="990600" y="260838"/>
+                  <a:pt x="1263162" y="474784"/>
+                  <a:pt x="1371600" y="439615"/>
+                </a:cubicBezTo>
+                <a:cubicBezTo>
+                  <a:pt x="1480038" y="404446"/>
+                  <a:pt x="1433146" y="114300"/>
+                  <a:pt x="1529861" y="87923"/>
+                </a:cubicBezTo>
+                <a:cubicBezTo>
+                  <a:pt x="1626576" y="61546"/>
+                  <a:pt x="1852246" y="290146"/>
+                  <a:pt x="1951892" y="281354"/>
+                </a:cubicBezTo>
+                <a:cubicBezTo>
+                  <a:pt x="2051538" y="272562"/>
+                  <a:pt x="2060330" y="61546"/>
+                  <a:pt x="2127738" y="35169"/>
+                </a:cubicBezTo>
+                <a:cubicBezTo>
+                  <a:pt x="2195146" y="8792"/>
+                  <a:pt x="2291861" y="128953"/>
+                  <a:pt x="2356338" y="123092"/>
+                </a:cubicBezTo>
+                <a:cubicBezTo>
+                  <a:pt x="2420815" y="117230"/>
+                  <a:pt x="2467707" y="58615"/>
+                  <a:pt x="2514600" y="0"/>
+                </a:cubicBezTo>
+              </a:path>
+            </a:pathLst>
+          </a:custGeom>
+          <a:noFill/>
+        </p:spPr>
+        <p:style>
+          <a:lnRef idx="2">
+            <a:schemeClr val="accent1">
+              <a:shade val="50000"/>
+            </a:schemeClr>
+          </a:lnRef>
+          <a:fillRef idx="1">
+            <a:schemeClr val="accent1"/>
+          </a:fillRef>
+          <a:effectRef idx="0">
+            <a:schemeClr val="accent1"/>
+          </a:effectRef>
+          <a:fontRef idx="minor">
+            <a:schemeClr val="lt1"/>
+          </a:fontRef>
+        </p:style>
+        <p:txBody>
+          <a:bodyPr rtlCol="0" anchor="ctr"/>
+          <a:lstStyle/>
+          <a:p>
+            <a:pPr algn="ctr"/>
+            <a:endParaRPr lang="en-CA"/>
+          </a:p>
+        </p:txBody>
+      </p:sp>
+      <p:sp>
+        <p:nvSpPr>
+          <p:cNvPr id="14" name="TextBox 13"/>
+          <p:cNvSpPr txBox="1"/>
+          <p:nvPr/>
+        </p:nvSpPr>
+        <p:spPr>
+          <a:xfrm>
+            <a:off x="3077308" y="3587234"/>
+            <a:ext cx="2370264" cy="369332"/>
+          </a:xfrm>
+          <a:prstGeom prst="rect">
+            <a:avLst/>
+          </a:prstGeom>
+          <a:noFill/>
+        </p:spPr>
+        <p:txBody>
+          <a:bodyPr wrap="none" rtlCol="0">
+            <a:spAutoFit/>
+          </a:bodyPr>
+          <a:lstStyle/>
+          <a:p>
+            <a:r>
+              <a:rPr lang="en-CA" dirty="0" smtClean="0"/>
+              <a:t>G = Distance from start </a:t>
+            </a:r>
+            <a:endParaRPr lang="en-CA" dirty="0"/>
+          </a:p>
+        </p:txBody>
+      </p:sp>
+      <p:sp>
+        <p:nvSpPr>
+          <p:cNvPr id="15" name="TextBox 14"/>
+          <p:cNvSpPr txBox="1"/>
+          <p:nvPr/>
+        </p:nvSpPr>
+        <p:spPr>
+          <a:xfrm>
+            <a:off x="6892430" y="4624754"/>
+            <a:ext cx="3001847" cy="369332"/>
+          </a:xfrm>
+          <a:prstGeom prst="rect">
+            <a:avLst/>
+          </a:prstGeom>
+          <a:noFill/>
+        </p:spPr>
+        <p:txBody>
+          <a:bodyPr wrap="none" rtlCol="0">
+            <a:spAutoFit/>
+          </a:bodyPr>
+          <a:lstStyle/>
+          <a:p>
+            <a:r>
+              <a:rPr lang="en-CA" dirty="0" smtClean="0"/>
+              <a:t>H = Estimated Distance to goal</a:t>
+            </a:r>
+            <a:endParaRPr lang="en-CA" dirty="0"/>
+          </a:p>
+        </p:txBody>
+      </p:sp>
+      <p:sp>
+        <p:nvSpPr>
+          <p:cNvPr id="16" name="TextBox 15"/>
+          <p:cNvSpPr txBox="1"/>
+          <p:nvPr/>
+        </p:nvSpPr>
+        <p:spPr>
+          <a:xfrm>
+            <a:off x="4970881" y="6247715"/>
+            <a:ext cx="2230291" cy="369332"/>
+          </a:xfrm>
+          <a:prstGeom prst="rect">
+            <a:avLst/>
+          </a:prstGeom>
+          <a:noFill/>
+        </p:spPr>
+        <p:txBody>
+          <a:bodyPr wrap="none" rtlCol="0">
+            <a:spAutoFit/>
+          </a:bodyPr>
+          <a:lstStyle/>
+          <a:p>
+            <a:r>
+              <a:rPr lang="en-CA" dirty="0" smtClean="0"/>
+              <a:t> Total Cost  = </a:t>
+            </a:r>
+            <a:r>
+              <a:rPr lang="en-CA" b="1" dirty="0" smtClean="0">
+                <a:solidFill>
+                  <a:srgbClr val="00B050"/>
+                </a:solidFill>
+              </a:rPr>
+              <a:t>F = G + H</a:t>
+            </a:r>
+            <a:endParaRPr lang="en-CA" b="1" dirty="0">
+              <a:solidFill>
+                <a:srgbClr val="00B050"/>
+              </a:solidFill>
+            </a:endParaRPr>
           </a:p>
         </p:txBody>
       </p:sp>
     </p:spTree>
     <p:extLst>
       <p:ext uri="{BB962C8B-B14F-4D97-AF65-F5344CB8AC3E}">
-        <p14:creationId xmlns:p14="http://schemas.microsoft.com/office/powerpoint/2010/main" val="1775106702"/>
+        <p14:creationId xmlns:p14="http://schemas.microsoft.com/office/powerpoint/2010/main" val="149037392"/>
       </p:ext>
     </p:extLst>
   </p:cSld>
@@ -9226,12 +9628,8 @@
           <a:lstStyle/>
           <a:p>
             <a:r>
-              <a:rPr lang="en-CA" dirty="0" err="1" smtClean="0"/>
-              <a:t>Excercise</a:t>
-            </a:r>
-            <a:r>
               <a:rPr lang="en-CA" dirty="0" smtClean="0"/>
-              <a:t>	</a:t>
+              <a:t>Yeah but I’m using a grid as my graph</a:t>
             </a:r>
             <a:endParaRPr lang="en-CA" dirty="0"/>
           </a:p>
@@ -9254,36 +9652,7 @@
           <a:p>
             <a:r>
               <a:rPr lang="en-CA" dirty="0" smtClean="0"/>
-              <a:t>Optimize the data structures in the Example in order to obtain a faster run time</a:t>
-            </a:r>
-          </a:p>
-          <a:p>
-            <a:endParaRPr lang="en-CA" dirty="0"/>
-          </a:p>
-          <a:p>
-            <a:r>
-              <a:rPr lang="en-CA" dirty="0" smtClean="0"/>
-              <a:t>Hint:</a:t>
-            </a:r>
-          </a:p>
-          <a:p>
-            <a:r>
-              <a:rPr lang="en-CA" dirty="0" err="1" smtClean="0"/>
-              <a:t>Openlist</a:t>
-            </a:r>
-            <a:r>
-              <a:rPr lang="en-CA" dirty="0" smtClean="0"/>
-              <a:t> should have a small insertion time</a:t>
-            </a:r>
-          </a:p>
-          <a:p>
-            <a:r>
-              <a:rPr lang="en-CA" dirty="0" err="1" smtClean="0"/>
-              <a:t>Closedlist</a:t>
-            </a:r>
-            <a:r>
-              <a:rPr lang="en-CA" dirty="0" smtClean="0"/>
-              <a:t> should have a small insertion time and lookup time</a:t>
+              <a:t>Ok lets look at the example code</a:t>
             </a:r>
             <a:endParaRPr lang="en-CA" dirty="0"/>
           </a:p>
@@ -9292,13 +9661,20 @@
     </p:spTree>
     <p:extLst>
       <p:ext uri="{BB962C8B-B14F-4D97-AF65-F5344CB8AC3E}">
-        <p14:creationId xmlns:p14="http://schemas.microsoft.com/office/powerpoint/2010/main" val="3589332055"/>
+        <p14:creationId xmlns:p14="http://schemas.microsoft.com/office/powerpoint/2010/main" val="1775106702"/>
       </p:ext>
     </p:extLst>
   </p:cSld>
   <p:clrMapOvr>
     <a:masterClrMapping/>
   </p:clrMapOvr>
+  <p:timing>
+    <p:tnLst>
+      <p:par>
+        <p:cTn id="1" dur="indefinite" restart="never" nodeType="tmRoot"/>
+      </p:par>
+    </p:tnLst>
+  </p:timing>
 </p:sld>
 </file>
 
@@ -9335,8 +9711,12 @@
           <a:lstStyle/>
           <a:p>
             <a:r>
+              <a:rPr lang="en-CA" dirty="0" err="1" smtClean="0"/>
+              <a:t>Excercise</a:t>
+            </a:r>
+            <a:r>
               <a:rPr lang="en-CA" dirty="0" smtClean="0"/>
-              <a:t>Recap</a:t>
+              <a:t>	</a:t>
             </a:r>
             <a:endParaRPr lang="en-CA" dirty="0"/>
           </a:p>
@@ -9359,33 +9739,58 @@
           <a:p>
             <a:r>
               <a:rPr lang="en-CA" dirty="0" smtClean="0"/>
-              <a:t>Easier Collision detection</a:t>
-            </a:r>
+              <a:t>Optimize the data structures in the Example in order to obtain a faster run time</a:t>
+            </a:r>
+          </a:p>
+          <a:p>
+            <a:endParaRPr lang="en-CA" dirty="0"/>
           </a:p>
           <a:p>
             <a:r>
               <a:rPr lang="en-CA" dirty="0" smtClean="0"/>
-              <a:t>Easier Controller architecture</a:t>
-            </a:r>
-          </a:p>
-          <a:p>
+              <a:t>Hint:</a:t>
+            </a:r>
+          </a:p>
+          <a:p>
+            <a:r>
+              <a:rPr lang="en-CA" dirty="0" err="1" smtClean="0"/>
+              <a:t>Openlist</a:t>
+            </a:r>
             <a:r>
               <a:rPr lang="en-CA" dirty="0" smtClean="0"/>
-              <a:t>Implementing A star search</a:t>
-            </a:r>
+              <a:t> should have a small insertion time</a:t>
+            </a:r>
+          </a:p>
+          <a:p>
+            <a:r>
+              <a:rPr lang="en-CA" dirty="0" err="1" smtClean="0"/>
+              <a:t>Closedlist</a:t>
+            </a:r>
+            <a:r>
+              <a:rPr lang="en-CA" dirty="0" smtClean="0"/>
+              <a:t> should have a small insertion time and lookup time</a:t>
+            </a:r>
+            <a:endParaRPr lang="en-CA" dirty="0"/>
           </a:p>
         </p:txBody>
       </p:sp>
     </p:spTree>
     <p:extLst>
       <p:ext uri="{BB962C8B-B14F-4D97-AF65-F5344CB8AC3E}">
-        <p14:creationId xmlns:p14="http://schemas.microsoft.com/office/powerpoint/2010/main" val="156548046"/>
+        <p14:creationId xmlns:p14="http://schemas.microsoft.com/office/powerpoint/2010/main" val="3589332055"/>
       </p:ext>
     </p:extLst>
   </p:cSld>
   <p:clrMapOvr>
     <a:masterClrMapping/>
   </p:clrMapOvr>
+  <p:timing>
+    <p:tnLst>
+      <p:par>
+        <p:cTn id="1" dur="indefinite" restart="never" nodeType="tmRoot"/>
+      </p:par>
+    </p:tnLst>
+  </p:timing>
 </p:sld>
 </file>
 
@@ -9423,6 +9828,100 @@
           <a:p>
             <a:r>
               <a:rPr lang="en-CA" dirty="0" smtClean="0"/>
+              <a:t>Recap</a:t>
+            </a:r>
+            <a:endParaRPr lang="en-CA" dirty="0"/>
+          </a:p>
+        </p:txBody>
+      </p:sp>
+      <p:sp>
+        <p:nvSpPr>
+          <p:cNvPr id="3" name="Content Placeholder 2"/>
+          <p:cNvSpPr>
+            <a:spLocks noGrp="1"/>
+          </p:cNvSpPr>
+          <p:nvPr>
+            <p:ph idx="1"/>
+          </p:nvPr>
+        </p:nvSpPr>
+        <p:spPr/>
+        <p:txBody>
+          <a:bodyPr/>
+          <a:lstStyle/>
+          <a:p>
+            <a:r>
+              <a:rPr lang="en-CA" dirty="0" smtClean="0"/>
+              <a:t>Easier Collision detection</a:t>
+            </a:r>
+          </a:p>
+          <a:p>
+            <a:r>
+              <a:rPr lang="en-CA" dirty="0" smtClean="0"/>
+              <a:t>Easier Controller architecture</a:t>
+            </a:r>
+          </a:p>
+          <a:p>
+            <a:r>
+              <a:rPr lang="en-CA" dirty="0" smtClean="0"/>
+              <a:t>Implementing A star search</a:t>
+            </a:r>
+          </a:p>
+        </p:txBody>
+      </p:sp>
+    </p:spTree>
+    <p:extLst>
+      <p:ext uri="{BB962C8B-B14F-4D97-AF65-F5344CB8AC3E}">
+        <p14:creationId xmlns:p14="http://schemas.microsoft.com/office/powerpoint/2010/main" val="156548046"/>
+      </p:ext>
+    </p:extLst>
+  </p:cSld>
+  <p:clrMapOvr>
+    <a:masterClrMapping/>
+  </p:clrMapOvr>
+  <p:timing>
+    <p:tnLst>
+      <p:par>
+        <p:cTn id="1" dur="indefinite" restart="never" nodeType="tmRoot"/>
+      </p:par>
+    </p:tnLst>
+  </p:timing>
+</p:sld>
+</file>
+
+<file path=ppt/slides/slide23.xml><?xml version="1.0" encoding="utf-8"?>
+<p:sld xmlns:a="http://schemas.openxmlformats.org/drawingml/2006/main" xmlns:r="http://schemas.openxmlformats.org/officeDocument/2006/relationships" xmlns:p="http://schemas.openxmlformats.org/presentationml/2006/main">
+  <p:cSld>
+    <p:spTree>
+      <p:nvGrpSpPr>
+        <p:cNvPr id="1" name=""/>
+        <p:cNvGrpSpPr/>
+        <p:nvPr/>
+      </p:nvGrpSpPr>
+      <p:grpSpPr>
+        <a:xfrm>
+          <a:off x="0" y="0"/>
+          <a:ext cx="0" cy="0"/>
+          <a:chOff x="0" y="0"/>
+          <a:chExt cx="0" cy="0"/>
+        </a:xfrm>
+      </p:grpSpPr>
+      <p:sp>
+        <p:nvSpPr>
+          <p:cNvPr id="2" name="Title 1"/>
+          <p:cNvSpPr>
+            <a:spLocks noGrp="1"/>
+          </p:cNvSpPr>
+          <p:nvPr>
+            <p:ph type="title"/>
+          </p:nvPr>
+        </p:nvSpPr>
+        <p:spPr/>
+        <p:txBody>
+          <a:bodyPr/>
+          <a:lstStyle/>
+          <a:p>
+            <a:r>
+              <a:rPr lang="en-CA" dirty="0" smtClean="0"/>
               <a:t>Resources</a:t>
             </a:r>
             <a:endParaRPr lang="en-CA" dirty="0"/>
@@ -9508,6 +10007,13 @@
   <p:clrMapOvr>
     <a:masterClrMapping/>
   </p:clrMapOvr>
+  <p:timing>
+    <p:tnLst>
+      <p:par>
+        <p:cTn id="1" dur="indefinite" restart="never" nodeType="tmRoot"/>
+      </p:par>
+    </p:tnLst>
+  </p:timing>
 </p:sld>
 </file>
 
@@ -9590,6 +10096,13 @@
   <p:clrMapOvr>
     <a:masterClrMapping/>
   </p:clrMapOvr>
+  <p:timing>
+    <p:tnLst>
+      <p:par>
+        <p:cTn id="1" dur="indefinite" restart="never" nodeType="tmRoot"/>
+      </p:par>
+    </p:tnLst>
+  </p:timing>
 </p:sld>
 </file>
 
@@ -9732,6 +10245,13 @@
   <p:clrMapOvr>
     <a:masterClrMapping/>
   </p:clrMapOvr>
+  <p:timing>
+    <p:tnLst>
+      <p:par>
+        <p:cTn id="1" dur="indefinite" restart="never" nodeType="tmRoot"/>
+      </p:par>
+    </p:tnLst>
+  </p:timing>
 </p:sld>
 </file>
 
@@ -9882,6 +10402,13 @@
   <p:clrMapOvr>
     <a:masterClrMapping/>
   </p:clrMapOvr>
+  <p:timing>
+    <p:tnLst>
+      <p:par>
+        <p:cTn id="1" dur="indefinite" restart="never" nodeType="tmRoot"/>
+      </p:par>
+    </p:tnLst>
+  </p:timing>
 </p:sld>
 </file>
 
@@ -10084,6 +10611,13 @@
   <p:clrMapOvr>
     <a:masterClrMapping/>
   </p:clrMapOvr>
+  <p:timing>
+    <p:tnLst>
+      <p:par>
+        <p:cTn id="1" dur="indefinite" restart="never" nodeType="tmRoot"/>
+      </p:par>
+    </p:tnLst>
+  </p:timing>
 </p:sld>
 </file>
 
@@ -10193,6 +10727,13 @@
   <p:clrMapOvr>
     <a:masterClrMapping/>
   </p:clrMapOvr>
+  <p:timing>
+    <p:tnLst>
+      <p:par>
+        <p:cTn id="1" dur="indefinite" restart="never" nodeType="tmRoot"/>
+      </p:par>
+    </p:tnLst>
+  </p:timing>
 </p:sld>
 </file>
 

</xml_diff>